<commit_message>
modified some pictures and readme.md
</commit_message>
<xml_diff>
--- a/基于SSM的学生管理系统.pptx
+++ b/基于SSM的学生管理系统.pptx
@@ -7967,7 +7967,7 @@
           <a:p>
             <a:fld id="{8542807C-8EC9-4658-AD53-C98D8DFE518F}" type="datetimeFigureOut">
               <a:rPr lang="zh-CN" altLang="en-US" smtClean="0"/>
-              <a:t>2021/12/29</a:t>
+              <a:t>2022/1/4</a:t>
             </a:fld>
             <a:endParaRPr lang="zh-CN" altLang="en-US"/>
           </a:p>
@@ -17449,7 +17449,7 @@
           <a:p>
             <a:fld id="{CA2C5225-B2F4-4364-A5DF-C8C120907DC2}" type="datetimeFigureOut">
               <a:rPr lang="zh-CN" altLang="en-US" smtClean="0"/>
-              <a:t>2021/12/29</a:t>
+              <a:t>2022/1/4</a:t>
             </a:fld>
             <a:endParaRPr lang="zh-CN" altLang="en-US"/>
           </a:p>
@@ -17656,7 +17656,7 @@
           <a:p>
             <a:fld id="{CA2C5225-B2F4-4364-A5DF-C8C120907DC2}" type="datetimeFigureOut">
               <a:rPr lang="zh-CN" altLang="en-US" smtClean="0"/>
-              <a:t>2021/12/29</a:t>
+              <a:t>2022/1/4</a:t>
             </a:fld>
             <a:endParaRPr lang="zh-CN" altLang="en-US"/>
           </a:p>
@@ -17836,7 +17836,7 @@
           <a:p>
             <a:fld id="{CA2C5225-B2F4-4364-A5DF-C8C120907DC2}" type="datetimeFigureOut">
               <a:rPr lang="zh-CN" altLang="en-US" smtClean="0"/>
-              <a:t>2021/12/29</a:t>
+              <a:t>2022/1/4</a:t>
             </a:fld>
             <a:endParaRPr lang="zh-CN" altLang="en-US"/>
           </a:p>
@@ -18041,7 +18041,7 @@
           <a:p>
             <a:fld id="{CA2C5225-B2F4-4364-A5DF-C8C120907DC2}" type="datetimeFigureOut">
               <a:rPr lang="zh-CN" altLang="en-US" smtClean="0"/>
-              <a:t>2021/12/29</a:t>
+              <a:t>2022/1/4</a:t>
             </a:fld>
             <a:endParaRPr lang="zh-CN" altLang="en-US"/>
           </a:p>
@@ -26939,7 +26939,7 @@
           <a:p>
             <a:fld id="{CA2C5225-B2F4-4364-A5DF-C8C120907DC2}" type="datetimeFigureOut">
               <a:rPr lang="zh-CN" altLang="en-US" smtClean="0"/>
-              <a:t>2021/12/29</a:t>
+              <a:t>2022/1/4</a:t>
             </a:fld>
             <a:endParaRPr lang="zh-CN" altLang="en-US"/>
           </a:p>
@@ -27213,7 +27213,7 @@
           <a:p>
             <a:fld id="{CA2C5225-B2F4-4364-A5DF-C8C120907DC2}" type="datetimeFigureOut">
               <a:rPr lang="zh-CN" altLang="en-US" smtClean="0"/>
-              <a:t>2021/12/29</a:t>
+              <a:t>2022/1/4</a:t>
             </a:fld>
             <a:endParaRPr lang="zh-CN" altLang="en-US"/>
           </a:p>
@@ -27611,7 +27611,7 @@
           <a:p>
             <a:fld id="{CA2C5225-B2F4-4364-A5DF-C8C120907DC2}" type="datetimeFigureOut">
               <a:rPr lang="zh-CN" altLang="en-US" smtClean="0"/>
-              <a:t>2021/12/29</a:t>
+              <a:t>2022/1/4</a:t>
             </a:fld>
             <a:endParaRPr lang="zh-CN" altLang="en-US"/>
           </a:p>
@@ -27729,7 +27729,7 @@
           <a:p>
             <a:fld id="{CA2C5225-B2F4-4364-A5DF-C8C120907DC2}" type="datetimeFigureOut">
               <a:rPr lang="zh-CN" altLang="en-US" smtClean="0"/>
-              <a:t>2021/12/29</a:t>
+              <a:t>2022/1/4</a:t>
             </a:fld>
             <a:endParaRPr lang="zh-CN" altLang="en-US"/>
           </a:p>
@@ -27824,7 +27824,7 @@
           <a:p>
             <a:fld id="{CA2C5225-B2F4-4364-A5DF-C8C120907DC2}" type="datetimeFigureOut">
               <a:rPr lang="zh-CN" altLang="en-US" smtClean="0"/>
-              <a:t>2021/12/29</a:t>
+              <a:t>2022/1/4</a:t>
             </a:fld>
             <a:endParaRPr lang="zh-CN" altLang="en-US"/>
           </a:p>
@@ -28114,7 +28114,7 @@
           <a:p>
             <a:fld id="{CA2C5225-B2F4-4364-A5DF-C8C120907DC2}" type="datetimeFigureOut">
               <a:rPr lang="zh-CN" altLang="en-US" smtClean="0"/>
-              <a:t>2021/12/29</a:t>
+              <a:t>2022/1/4</a:t>
             </a:fld>
             <a:endParaRPr lang="zh-CN" altLang="en-US"/>
           </a:p>
@@ -28394,7 +28394,7 @@
           <a:p>
             <a:fld id="{CA2C5225-B2F4-4364-A5DF-C8C120907DC2}" type="datetimeFigureOut">
               <a:rPr lang="zh-CN" altLang="en-US" smtClean="0"/>
-              <a:t>2021/12/29</a:t>
+              <a:t>2022/1/4</a:t>
             </a:fld>
             <a:endParaRPr lang="zh-CN" altLang="en-US"/>
           </a:p>
@@ -28644,7 +28644,7 @@
           <a:p>
             <a:fld id="{CA2C5225-B2F4-4364-A5DF-C8C120907DC2}" type="datetimeFigureOut">
               <a:rPr lang="zh-CN" altLang="en-US" smtClean="0"/>
-              <a:t>2021/12/29</a:t>
+              <a:t>2022/1/4</a:t>
             </a:fld>
             <a:endParaRPr lang="zh-CN" altLang="en-US"/>
           </a:p>
@@ -29203,10 +29203,6 @@
           <a:bodyPr/>
           <a:lstStyle/>
           <a:p>
-            <a:r>
-              <a:rPr lang="zh-CN" altLang="en-US" dirty="0"/>
-              <a:t>汇报人：李鹏</a:t>
-            </a:r>
             <a:endParaRPr lang="en-US" altLang="zh-CN" dirty="0"/>
           </a:p>
         </p:txBody>

</xml_diff>